<commit_message>
created module 0 and updated slides
</commit_message>
<xml_diff>
--- a/Slides/Module 2 - Object Oriented Programming.pptx
+++ b/Slides/Module 2 - Object Oriented Programming.pptx
@@ -243,7 +243,7 @@
           <a:p>
             <a:fld id="{312E7B4A-039C-48A2-9B2C-AF16AA3873D8}" type="datetimeFigureOut">
               <a:rPr lang="en-US" smtClean="0"/>
-              <a:t>2/25/2015</a:t>
+              <a:t>2/27/2015</a:t>
             </a:fld>
             <a:endParaRPr lang="en-US"/>
           </a:p>
@@ -408,7 +408,7 @@
           <a:p>
             <a:fld id="{DA005A0C-54D9-45AA-87D4-C551D08DFCE1}" type="datetimeFigureOut">
               <a:rPr lang="en-US" smtClean="0"/>
-              <a:t>2/25/2015</a:t>
+              <a:t>2/27/2015</a:t>
             </a:fld>
             <a:endParaRPr lang="en-US"/>
           </a:p>
@@ -1748,8 +1748,8 @@
               <a:t> to </a:t>
             </a:r>
             <a:r>
-              <a:rPr lang="en-US" baseline="0" dirty="0" err="1" smtClean="0"/>
-              <a:t>QuestionClient</a:t>
+              <a:rPr lang="en-US" baseline="0" dirty="0" smtClean="0"/>
+              <a:t>Client</a:t>
             </a:r>
             <a:r>
               <a:rPr lang="en-US" baseline="0" dirty="0" smtClean="0"/>
@@ -7925,11 +7925,11 @@
   <p:clrMapOvr>
     <a:masterClrMapping/>
   </p:clrMapOvr>
-  <mc:AlternateContent xmlns:mc="http://schemas.openxmlformats.org/markup-compatibility/2006">
-    <mc:Choice xmlns:p14="http://schemas.microsoft.com/office/powerpoint/2010/main" Requires="p14">
+  <mc:AlternateContent xmlns:mc="http://schemas.openxmlformats.org/markup-compatibility/2006" xmlns:p14="http://schemas.microsoft.com/office/powerpoint/2010/main">
+    <mc:Choice Requires="p14">
       <p:transition spd="slow" p14:dur="2000"/>
     </mc:Choice>
-    <mc:Fallback>
+    <mc:Fallback xmlns="">
       <p:transition spd="slow"/>
     </mc:Fallback>
   </mc:AlternateContent>
@@ -10037,12 +10037,9 @@
 </file>
 
 <file path=customXml/item1.xml><?xml version="1.0" encoding="utf-8"?>
-<?mso-contentType ?>
-<FormTemplates xmlns="http://schemas.microsoft.com/sharepoint/v3/contenttype/forms">
-  <Display>DocumentLibraryForm</Display>
-  <Edit>DocumentLibraryForm</Edit>
-  <New>DocumentLibraryForm</New>
-</FormTemplates>
+<p:properties xmlns:p="http://schemas.microsoft.com/office/2006/metadata/properties" xmlns:xsi="http://www.w3.org/2001/XMLSchema-instance" xmlns:pc="http://schemas.microsoft.com/office/infopath/2007/PartnerControls">
+  <documentManagement/>
+</p:properties>
 </file>
 
 <file path=customXml/item2.xml><?xml version="1.0" encoding="utf-8"?>
@@ -10186,15 +10183,26 @@
 </file>
 
 <file path=customXml/item3.xml><?xml version="1.0" encoding="utf-8"?>
-<p:properties xmlns:p="http://schemas.microsoft.com/office/2006/metadata/properties" xmlns:xsi="http://www.w3.org/2001/XMLSchema-instance" xmlns:pc="http://schemas.microsoft.com/office/infopath/2007/PartnerControls">
-  <documentManagement/>
-</p:properties>
+<?mso-contentType ?>
+<FormTemplates xmlns="http://schemas.microsoft.com/sharepoint/v3/contenttype/forms">
+  <Display>DocumentLibraryForm</Display>
+  <Edit>DocumentLibraryForm</Edit>
+  <New>DocumentLibraryForm</New>
+</FormTemplates>
 </file>
 
 <file path=customXml/itemProps1.xml><?xml version="1.0" encoding="utf-8"?>
-<ds:datastoreItem xmlns:ds="http://schemas.openxmlformats.org/officeDocument/2006/customXml" ds:itemID="{B0CA13EC-1D3C-4D6F-8D1C-E8A452CFC79A}">
+<ds:datastoreItem xmlns:ds="http://schemas.openxmlformats.org/officeDocument/2006/customXml" ds:itemID="{7025FDD9-4C58-4084-9F89-0E6ADD6FFF55}">
   <ds:schemaRefs>
-    <ds:schemaRef ds:uri="http://schemas.microsoft.com/sharepoint/v3/contenttype/forms"/>
+    <ds:schemaRef ds:uri="http://purl.org/dc/terms/"/>
+    <ds:schemaRef ds:uri="http://schemas.openxmlformats.org/package/2006/metadata/core-properties"/>
+    <ds:schemaRef ds:uri="http://schemas.microsoft.com/office/2006/documentManagement/types"/>
+    <ds:schemaRef ds:uri="http://schemas.microsoft.com/office/infopath/2007/PartnerControls"/>
+    <ds:schemaRef ds:uri="http://purl.org/dc/elements/1.1/"/>
+    <ds:schemaRef ds:uri="http://schemas.microsoft.com/office/2006/metadata/properties"/>
+    <ds:schemaRef ds:uri="e5a13ba8-98e3-4f23-a221-7ac9824aa662"/>
+    <ds:schemaRef ds:uri="http://www.w3.org/XML/1998/namespace"/>
+    <ds:schemaRef ds:uri="http://purl.org/dc/dcmitype/"/>
   </ds:schemaRefs>
 </ds:datastoreItem>
 </file>
@@ -10218,17 +10226,9 @@
 </file>
 
 <file path=customXml/itemProps3.xml><?xml version="1.0" encoding="utf-8"?>
-<ds:datastoreItem xmlns:ds="http://schemas.openxmlformats.org/officeDocument/2006/customXml" ds:itemID="{7025FDD9-4C58-4084-9F89-0E6ADD6FFF55}">
+<ds:datastoreItem xmlns:ds="http://schemas.openxmlformats.org/officeDocument/2006/customXml" ds:itemID="{B0CA13EC-1D3C-4D6F-8D1C-E8A452CFC79A}">
   <ds:schemaRefs>
-    <ds:schemaRef ds:uri="http://purl.org/dc/terms/"/>
-    <ds:schemaRef ds:uri="http://schemas.openxmlformats.org/package/2006/metadata/core-properties"/>
-    <ds:schemaRef ds:uri="http://schemas.microsoft.com/office/2006/documentManagement/types"/>
-    <ds:schemaRef ds:uri="http://schemas.microsoft.com/office/infopath/2007/PartnerControls"/>
-    <ds:schemaRef ds:uri="http://purl.org/dc/elements/1.1/"/>
-    <ds:schemaRef ds:uri="http://schemas.microsoft.com/office/2006/metadata/properties"/>
-    <ds:schemaRef ds:uri="e5a13ba8-98e3-4f23-a221-7ac9824aa662"/>
-    <ds:schemaRef ds:uri="http://www.w3.org/XML/1998/namespace"/>
-    <ds:schemaRef ds:uri="http://purl.org/dc/dcmitype/"/>
+    <ds:schemaRef ds:uri="http://schemas.microsoft.com/sharepoint/v3/contenttype/forms"/>
   </ds:schemaRefs>
 </ds:datastoreItem>
 </file>
</xml_diff>